<commit_message>
Added some more details
</commit_message>
<xml_diff>
--- a/Research Summary.pptx
+++ b/Research Summary.pptx
@@ -15,6 +15,7 @@
     <p:sldId id="266" r:id="rId9"/>
     <p:sldId id="267" r:id="rId10"/>
     <p:sldId id="268" r:id="rId11"/>
+    <p:sldId id="269" r:id="rId12"/>
   </p:sldIdLst>
   <p:sldSz cx="12192000" cy="6858000"/>
   <p:notesSz cx="6858000" cy="9144000"/>
@@ -113,6 +114,11 @@
       </a:defRPr>
     </a:lvl9pPr>
   </p:defaultTextStyle>
+  <p:extLst>
+    <p:ext uri="{EFAFB233-063F-42B5-8137-9DF3F51BA10A}">
+      <p15:sldGuideLst xmlns:p15="http://schemas.microsoft.com/office/powerpoint/2012/main"/>
+    </p:ext>
+  </p:extLst>
 </p:presentation>
 </file>
 
@@ -263,7 +269,7 @@
           <a:p>
             <a:fld id="{F4774072-BA16-42B2-B396-A300A3EBF598}" type="datetimeFigureOut">
               <a:rPr lang="en-US" smtClean="0"/>
-              <a:t>5/30/2022</a:t>
+              <a:t>9/6/2022</a:t>
             </a:fld>
             <a:endParaRPr lang="en-US"/>
           </a:p>
@@ -461,7 +467,7 @@
           <a:p>
             <a:fld id="{F4774072-BA16-42B2-B396-A300A3EBF598}" type="datetimeFigureOut">
               <a:rPr lang="en-US" smtClean="0"/>
-              <a:t>5/30/2022</a:t>
+              <a:t>9/6/2022</a:t>
             </a:fld>
             <a:endParaRPr lang="en-US"/>
           </a:p>
@@ -669,7 +675,7 @@
           <a:p>
             <a:fld id="{F4774072-BA16-42B2-B396-A300A3EBF598}" type="datetimeFigureOut">
               <a:rPr lang="en-US" smtClean="0"/>
-              <a:t>5/30/2022</a:t>
+              <a:t>9/6/2022</a:t>
             </a:fld>
             <a:endParaRPr lang="en-US"/>
           </a:p>
@@ -867,7 +873,7 @@
           <a:p>
             <a:fld id="{F4774072-BA16-42B2-B396-A300A3EBF598}" type="datetimeFigureOut">
               <a:rPr lang="en-US" smtClean="0"/>
-              <a:t>5/30/2022</a:t>
+              <a:t>9/6/2022</a:t>
             </a:fld>
             <a:endParaRPr lang="en-US"/>
           </a:p>
@@ -1142,7 +1148,7 @@
           <a:p>
             <a:fld id="{F4774072-BA16-42B2-B396-A300A3EBF598}" type="datetimeFigureOut">
               <a:rPr lang="en-US" smtClean="0"/>
-              <a:t>5/30/2022</a:t>
+              <a:t>9/6/2022</a:t>
             </a:fld>
             <a:endParaRPr lang="en-US"/>
           </a:p>
@@ -1407,7 +1413,7 @@
           <a:p>
             <a:fld id="{F4774072-BA16-42B2-B396-A300A3EBF598}" type="datetimeFigureOut">
               <a:rPr lang="en-US" smtClean="0"/>
-              <a:t>5/30/2022</a:t>
+              <a:t>9/6/2022</a:t>
             </a:fld>
             <a:endParaRPr lang="en-US"/>
           </a:p>
@@ -1819,7 +1825,7 @@
           <a:p>
             <a:fld id="{F4774072-BA16-42B2-B396-A300A3EBF598}" type="datetimeFigureOut">
               <a:rPr lang="en-US" smtClean="0"/>
-              <a:t>5/30/2022</a:t>
+              <a:t>9/6/2022</a:t>
             </a:fld>
             <a:endParaRPr lang="en-US"/>
           </a:p>
@@ -1960,7 +1966,7 @@
           <a:p>
             <a:fld id="{F4774072-BA16-42B2-B396-A300A3EBF598}" type="datetimeFigureOut">
               <a:rPr lang="en-US" smtClean="0"/>
-              <a:t>5/30/2022</a:t>
+              <a:t>9/6/2022</a:t>
             </a:fld>
             <a:endParaRPr lang="en-US"/>
           </a:p>
@@ -2073,7 +2079,7 @@
           <a:p>
             <a:fld id="{F4774072-BA16-42B2-B396-A300A3EBF598}" type="datetimeFigureOut">
               <a:rPr lang="en-US" smtClean="0"/>
-              <a:t>5/30/2022</a:t>
+              <a:t>9/6/2022</a:t>
             </a:fld>
             <a:endParaRPr lang="en-US"/>
           </a:p>
@@ -2384,7 +2390,7 @@
           <a:p>
             <a:fld id="{F4774072-BA16-42B2-B396-A300A3EBF598}" type="datetimeFigureOut">
               <a:rPr lang="en-US" smtClean="0"/>
-              <a:t>5/30/2022</a:t>
+              <a:t>9/6/2022</a:t>
             </a:fld>
             <a:endParaRPr lang="en-US"/>
           </a:p>
@@ -2672,7 +2678,7 @@
           <a:p>
             <a:fld id="{F4774072-BA16-42B2-B396-A300A3EBF598}" type="datetimeFigureOut">
               <a:rPr lang="en-US" smtClean="0"/>
-              <a:t>5/30/2022</a:t>
+              <a:t>9/6/2022</a:t>
             </a:fld>
             <a:endParaRPr lang="en-US"/>
           </a:p>
@@ -2913,7 +2919,7 @@
           <a:p>
             <a:fld id="{F4774072-BA16-42B2-B396-A300A3EBF598}" type="datetimeFigureOut">
               <a:rPr lang="en-US" smtClean="0"/>
-              <a:t>5/30/2022</a:t>
+              <a:t>9/6/2022</a:t>
             </a:fld>
             <a:endParaRPr lang="en-US"/>
           </a:p>
@@ -3467,7 +3473,9 @@
         </p:nvSpPr>
         <p:spPr/>
         <p:txBody>
-          <a:bodyPr/>
+          <a:bodyPr>
+            <a:normAutofit fontScale="92500" lnSpcReduction="10000"/>
+          </a:bodyPr>
           <a:lstStyle/>
           <a:p>
             <a:r>
@@ -3486,7 +3494,7 @@
             <a:pPr lvl="1"/>
             <a:r>
               <a:rPr lang="en-US" dirty="0"/>
-              <a:t>Pedestal Subtraction (signed result!! -&gt; need an extra bit)</a:t>
+              <a:t>Pedestal Subtraction (signed result!! -&gt; need an extra bit OR an offset)</a:t>
             </a:r>
           </a:p>
           <a:p>
@@ -3501,6 +3509,39 @@
             <a:r>
               <a:rPr lang="en-US" dirty="0"/>
               <a:t>Time Integrals (really sums)</a:t>
+            </a:r>
+          </a:p>
+          <a:p>
+            <a:pPr lvl="1"/>
+            <a:r>
+              <a:rPr lang="en-US" dirty="0"/>
+              <a:t>Centroiding</a:t>
+            </a:r>
+          </a:p>
+          <a:p>
+            <a:pPr lvl="1"/>
+            <a:r>
+              <a:rPr lang="en-US" dirty="0"/>
+              <a:t>Zero </a:t>
+            </a:r>
+            <a:r>
+              <a:rPr lang="en-US" dirty="0" err="1"/>
+              <a:t>Supression</a:t>
+            </a:r>
+            <a:endParaRPr lang="en-US" dirty="0"/>
+          </a:p>
+          <a:p>
+            <a:pPr lvl="1"/>
+            <a:r>
+              <a:rPr lang="en-US" dirty="0"/>
+              <a:t>Multi-event detection</a:t>
+            </a:r>
+          </a:p>
+          <a:p>
+            <a:pPr lvl="1"/>
+            <a:r>
+              <a:rPr lang="en-US" dirty="0"/>
+              <a:t>Data Compression</a:t>
             </a:r>
           </a:p>
           <a:p>
@@ -3530,6 +3571,883 @@
     <p:extLst>
       <p:ext uri="{BB962C8B-B14F-4D97-AF65-F5344CB8AC3E}">
         <p14:creationId xmlns:p14="http://schemas.microsoft.com/office/powerpoint/2010/main" val="2279035726"/>
+      </p:ext>
+    </p:extLst>
+  </p:cSld>
+  <p:clrMapOvr>
+    <a:masterClrMapping/>
+  </p:clrMapOvr>
+</p:sld>
+</file>
+
+<file path=ppt/slides/slide11.xml><?xml version="1.0" encoding="utf-8"?>
+<p:sld xmlns:a="http://schemas.openxmlformats.org/drawingml/2006/main" xmlns:r="http://schemas.openxmlformats.org/officeDocument/2006/relationships" xmlns:p="http://schemas.openxmlformats.org/presentationml/2006/main">
+  <p:cSld>
+    <p:spTree>
+      <p:nvGrpSpPr>
+        <p:cNvPr id="1" name=""/>
+        <p:cNvGrpSpPr/>
+        <p:nvPr/>
+      </p:nvGrpSpPr>
+      <p:grpSpPr>
+        <a:xfrm>
+          <a:off x="0" y="0"/>
+          <a:ext cx="0" cy="0"/>
+          <a:chOff x="0" y="0"/>
+          <a:chExt cx="0" cy="0"/>
+        </a:xfrm>
+      </p:grpSpPr>
+      <p:sp>
+        <p:nvSpPr>
+          <p:cNvPr id="2" name="Title 1">
+            <a:extLst>
+              <a:ext uri="{FF2B5EF4-FFF2-40B4-BE49-F238E27FC236}">
+                <a16:creationId xmlns:a16="http://schemas.microsoft.com/office/drawing/2014/main" id="{20084AD0-CCF9-58AC-42AD-19286F3887C6}"/>
+              </a:ext>
+            </a:extLst>
+          </p:cNvPr>
+          <p:cNvSpPr>
+            <a:spLocks noGrp="1"/>
+          </p:cNvSpPr>
+          <p:nvPr>
+            <p:ph type="title"/>
+          </p:nvPr>
+        </p:nvSpPr>
+        <p:spPr/>
+        <p:txBody>
+          <a:bodyPr/>
+          <a:lstStyle/>
+          <a:p>
+            <a:r>
+              <a:rPr lang="en-US" dirty="0"/>
+              <a:t>System Logic Blocks</a:t>
+            </a:r>
+          </a:p>
+        </p:txBody>
+      </p:sp>
+      <p:sp>
+        <p:nvSpPr>
+          <p:cNvPr id="6" name="Rectangle 5">
+            <a:extLst>
+              <a:ext uri="{FF2B5EF4-FFF2-40B4-BE49-F238E27FC236}">
+                <a16:creationId xmlns:a16="http://schemas.microsoft.com/office/drawing/2014/main" id="{B39FC995-9F4B-C981-EC3B-96D6EF3D8D24}"/>
+              </a:ext>
+            </a:extLst>
+          </p:cNvPr>
+          <p:cNvSpPr/>
+          <p:nvPr/>
+        </p:nvSpPr>
+        <p:spPr>
+          <a:xfrm>
+            <a:off x="2330246" y="2114396"/>
+            <a:ext cx="1401097" cy="1325563"/>
+          </a:xfrm>
+          <a:prstGeom prst="rect">
+            <a:avLst/>
+          </a:prstGeom>
+        </p:spPr>
+        <p:style>
+          <a:lnRef idx="2">
+            <a:schemeClr val="accent1">
+              <a:shade val="50000"/>
+            </a:schemeClr>
+          </a:lnRef>
+          <a:fillRef idx="1">
+            <a:schemeClr val="accent1"/>
+          </a:fillRef>
+          <a:effectRef idx="0">
+            <a:schemeClr val="accent1"/>
+          </a:effectRef>
+          <a:fontRef idx="minor">
+            <a:schemeClr val="lt1"/>
+          </a:fontRef>
+        </p:style>
+        <p:txBody>
+          <a:bodyPr rtlCol="0" anchor="ctr"/>
+          <a:lstStyle/>
+          <a:p>
+            <a:pPr algn="ctr"/>
+            <a:r>
+              <a:rPr lang="en-US" dirty="0"/>
+              <a:t>Pedestal Subtraction (Samples – Pedestals)</a:t>
+            </a:r>
+          </a:p>
+        </p:txBody>
+      </p:sp>
+      <p:sp>
+        <p:nvSpPr>
+          <p:cNvPr id="7" name="TextBox 6">
+            <a:extLst>
+              <a:ext uri="{FF2B5EF4-FFF2-40B4-BE49-F238E27FC236}">
+                <a16:creationId xmlns:a16="http://schemas.microsoft.com/office/drawing/2014/main" id="{AC040279-0DBC-464F-7358-2BCA43403CC2}"/>
+              </a:ext>
+            </a:extLst>
+          </p:cNvPr>
+          <p:cNvSpPr txBox="1"/>
+          <p:nvPr/>
+        </p:nvSpPr>
+        <p:spPr>
+          <a:xfrm>
+            <a:off x="707922" y="3059668"/>
+            <a:ext cx="1401097" cy="369332"/>
+          </a:xfrm>
+          <a:prstGeom prst="rect">
+            <a:avLst/>
+          </a:prstGeom>
+          <a:noFill/>
+        </p:spPr>
+        <p:txBody>
+          <a:bodyPr wrap="square" rtlCol="0">
+            <a:spAutoFit/>
+          </a:bodyPr>
+          <a:lstStyle/>
+          <a:p>
+            <a:pPr algn="ctr"/>
+            <a:r>
+              <a:rPr lang="en-US" dirty="0"/>
+              <a:t>Pedestals</a:t>
+            </a:r>
+          </a:p>
+        </p:txBody>
+      </p:sp>
+      <p:sp>
+        <p:nvSpPr>
+          <p:cNvPr id="8" name="TextBox 7">
+            <a:extLst>
+              <a:ext uri="{FF2B5EF4-FFF2-40B4-BE49-F238E27FC236}">
+                <a16:creationId xmlns:a16="http://schemas.microsoft.com/office/drawing/2014/main" id="{51CAA8D0-AC1E-1FBF-A1BB-6EC3B5DFEC28}"/>
+              </a:ext>
+            </a:extLst>
+          </p:cNvPr>
+          <p:cNvSpPr txBox="1"/>
+          <p:nvPr/>
+        </p:nvSpPr>
+        <p:spPr>
+          <a:xfrm>
+            <a:off x="619432" y="2052012"/>
+            <a:ext cx="1401097" cy="646331"/>
+          </a:xfrm>
+          <a:prstGeom prst="rect">
+            <a:avLst/>
+          </a:prstGeom>
+          <a:noFill/>
+        </p:spPr>
+        <p:txBody>
+          <a:bodyPr wrap="square" rtlCol="0">
+            <a:spAutoFit/>
+          </a:bodyPr>
+          <a:lstStyle/>
+          <a:p>
+            <a:pPr algn="ctr"/>
+            <a:r>
+              <a:rPr lang="en-US" dirty="0"/>
+              <a:t>Samples </a:t>
+            </a:r>
+          </a:p>
+          <a:p>
+            <a:pPr algn="ctr"/>
+            <a:r>
+              <a:rPr lang="en-US" dirty="0"/>
+              <a:t>(+ Offset)</a:t>
+            </a:r>
+          </a:p>
+        </p:txBody>
+      </p:sp>
+      <p:cxnSp>
+        <p:nvCxnSpPr>
+          <p:cNvPr id="10" name="Straight Arrow Connector 9">
+            <a:extLst>
+              <a:ext uri="{FF2B5EF4-FFF2-40B4-BE49-F238E27FC236}">
+                <a16:creationId xmlns:a16="http://schemas.microsoft.com/office/drawing/2014/main" id="{94430101-A98B-C18C-C834-72347DF04110}"/>
+              </a:ext>
+            </a:extLst>
+          </p:cNvPr>
+          <p:cNvCxnSpPr/>
+          <p:nvPr/>
+        </p:nvCxnSpPr>
+        <p:spPr>
+          <a:xfrm>
+            <a:off x="1887794" y="2375178"/>
+            <a:ext cx="442452" cy="184666"/>
+          </a:xfrm>
+          <a:prstGeom prst="straightConnector1">
+            <a:avLst/>
+          </a:prstGeom>
+          <a:ln w="38100">
+            <a:tailEnd type="triangle"/>
+          </a:ln>
+        </p:spPr>
+        <p:style>
+          <a:lnRef idx="1">
+            <a:schemeClr val="accent1"/>
+          </a:lnRef>
+          <a:fillRef idx="0">
+            <a:schemeClr val="accent1"/>
+          </a:fillRef>
+          <a:effectRef idx="0">
+            <a:schemeClr val="accent1"/>
+          </a:effectRef>
+          <a:fontRef idx="minor">
+            <a:schemeClr val="tx1"/>
+          </a:fontRef>
+        </p:style>
+      </p:cxnSp>
+      <p:cxnSp>
+        <p:nvCxnSpPr>
+          <p:cNvPr id="11" name="Straight Arrow Connector 10">
+            <a:extLst>
+              <a:ext uri="{FF2B5EF4-FFF2-40B4-BE49-F238E27FC236}">
+                <a16:creationId xmlns:a16="http://schemas.microsoft.com/office/drawing/2014/main" id="{FE088F1D-794B-25DE-64AB-7C9D1CE844BE}"/>
+              </a:ext>
+            </a:extLst>
+          </p:cNvPr>
+          <p:cNvCxnSpPr>
+            <a:cxnSpLocks/>
+          </p:cNvCxnSpPr>
+          <p:nvPr/>
+        </p:nvCxnSpPr>
+        <p:spPr>
+          <a:xfrm flipV="1">
+            <a:off x="1887794" y="3059668"/>
+            <a:ext cx="442452" cy="184666"/>
+          </a:xfrm>
+          <a:prstGeom prst="straightConnector1">
+            <a:avLst/>
+          </a:prstGeom>
+          <a:ln w="38100">
+            <a:tailEnd type="triangle"/>
+          </a:ln>
+        </p:spPr>
+        <p:style>
+          <a:lnRef idx="1">
+            <a:schemeClr val="accent1"/>
+          </a:lnRef>
+          <a:fillRef idx="0">
+            <a:schemeClr val="accent1"/>
+          </a:fillRef>
+          <a:effectRef idx="0">
+            <a:schemeClr val="accent1"/>
+          </a:effectRef>
+          <a:fontRef idx="minor">
+            <a:schemeClr val="tx1"/>
+          </a:fontRef>
+        </p:style>
+      </p:cxnSp>
+      <p:cxnSp>
+        <p:nvCxnSpPr>
+          <p:cNvPr id="13" name="Straight Arrow Connector 12">
+            <a:extLst>
+              <a:ext uri="{FF2B5EF4-FFF2-40B4-BE49-F238E27FC236}">
+                <a16:creationId xmlns:a16="http://schemas.microsoft.com/office/drawing/2014/main" id="{9E81EC74-5399-9EE4-EE6F-16E847169105}"/>
+              </a:ext>
+            </a:extLst>
+          </p:cNvPr>
+          <p:cNvCxnSpPr>
+            <a:stCxn id="6" idx="3"/>
+          </p:cNvCxnSpPr>
+          <p:nvPr/>
+        </p:nvCxnSpPr>
+        <p:spPr>
+          <a:xfrm flipV="1">
+            <a:off x="3731343" y="2777177"/>
+            <a:ext cx="501444" cy="1"/>
+          </a:xfrm>
+          <a:prstGeom prst="straightConnector1">
+            <a:avLst/>
+          </a:prstGeom>
+          <a:ln w="38100">
+            <a:tailEnd type="triangle"/>
+          </a:ln>
+        </p:spPr>
+        <p:style>
+          <a:lnRef idx="1">
+            <a:schemeClr val="accent1"/>
+          </a:lnRef>
+          <a:fillRef idx="0">
+            <a:schemeClr val="accent1"/>
+          </a:fillRef>
+          <a:effectRef idx="0">
+            <a:schemeClr val="accent1"/>
+          </a:effectRef>
+          <a:fontRef idx="minor">
+            <a:schemeClr val="tx1"/>
+          </a:fontRef>
+        </p:style>
+      </p:cxnSp>
+      <p:sp>
+        <p:nvSpPr>
+          <p:cNvPr id="14" name="TextBox 13">
+            <a:extLst>
+              <a:ext uri="{FF2B5EF4-FFF2-40B4-BE49-F238E27FC236}">
+                <a16:creationId xmlns:a16="http://schemas.microsoft.com/office/drawing/2014/main" id="{3C4352E6-B1E5-C737-C889-A61542D201D8}"/>
+              </a:ext>
+            </a:extLst>
+          </p:cNvPr>
+          <p:cNvSpPr txBox="1"/>
+          <p:nvPr/>
+        </p:nvSpPr>
+        <p:spPr>
+          <a:xfrm>
+            <a:off x="4070556" y="2592511"/>
+            <a:ext cx="1061884" cy="369332"/>
+          </a:xfrm>
+          <a:prstGeom prst="rect">
+            <a:avLst/>
+          </a:prstGeom>
+          <a:noFill/>
+        </p:spPr>
+        <p:txBody>
+          <a:bodyPr wrap="square" rtlCol="0">
+            <a:spAutoFit/>
+          </a:bodyPr>
+          <a:lstStyle/>
+          <a:p>
+            <a:pPr algn="ctr"/>
+            <a:r>
+              <a:rPr lang="en-US" dirty="0"/>
+              <a:t>Results</a:t>
+            </a:r>
+          </a:p>
+        </p:txBody>
+      </p:sp>
+      <p:sp>
+        <p:nvSpPr>
+          <p:cNvPr id="16" name="Rectangle 15">
+            <a:extLst>
+              <a:ext uri="{FF2B5EF4-FFF2-40B4-BE49-F238E27FC236}">
+                <a16:creationId xmlns:a16="http://schemas.microsoft.com/office/drawing/2014/main" id="{93856410-6ED5-3448-8B34-4BAF09E3140F}"/>
+              </a:ext>
+            </a:extLst>
+          </p:cNvPr>
+          <p:cNvSpPr/>
+          <p:nvPr/>
+        </p:nvSpPr>
+        <p:spPr>
+          <a:xfrm>
+            <a:off x="5471653" y="2112263"/>
+            <a:ext cx="1401097" cy="1325563"/>
+          </a:xfrm>
+          <a:prstGeom prst="rect">
+            <a:avLst/>
+          </a:prstGeom>
+        </p:spPr>
+        <p:style>
+          <a:lnRef idx="2">
+            <a:schemeClr val="accent1">
+              <a:shade val="50000"/>
+            </a:schemeClr>
+          </a:lnRef>
+          <a:fillRef idx="1">
+            <a:schemeClr val="accent1"/>
+          </a:fillRef>
+          <a:effectRef idx="0">
+            <a:schemeClr val="accent1"/>
+          </a:effectRef>
+          <a:fontRef idx="minor">
+            <a:schemeClr val="lt1"/>
+          </a:fontRef>
+        </p:style>
+        <p:txBody>
+          <a:bodyPr rtlCol="0" anchor="ctr"/>
+          <a:lstStyle/>
+          <a:p>
+            <a:pPr algn="ctr"/>
+            <a:r>
+              <a:rPr lang="en-US" dirty="0"/>
+              <a:t>4 Integrals</a:t>
+            </a:r>
+          </a:p>
+        </p:txBody>
+      </p:sp>
+      <p:cxnSp>
+        <p:nvCxnSpPr>
+          <p:cNvPr id="17" name="Straight Arrow Connector 16">
+            <a:extLst>
+              <a:ext uri="{FF2B5EF4-FFF2-40B4-BE49-F238E27FC236}">
+                <a16:creationId xmlns:a16="http://schemas.microsoft.com/office/drawing/2014/main" id="{95E1A857-69AC-905A-BA28-1426A4924956}"/>
+              </a:ext>
+            </a:extLst>
+          </p:cNvPr>
+          <p:cNvCxnSpPr/>
+          <p:nvPr/>
+        </p:nvCxnSpPr>
+        <p:spPr>
+          <a:xfrm flipV="1">
+            <a:off x="4970209" y="2775045"/>
+            <a:ext cx="501444" cy="1"/>
+          </a:xfrm>
+          <a:prstGeom prst="straightConnector1">
+            <a:avLst/>
+          </a:prstGeom>
+          <a:ln w="38100">
+            <a:tailEnd type="triangle"/>
+          </a:ln>
+        </p:spPr>
+        <p:style>
+          <a:lnRef idx="1">
+            <a:schemeClr val="accent1"/>
+          </a:lnRef>
+          <a:fillRef idx="0">
+            <a:schemeClr val="accent1"/>
+          </a:fillRef>
+          <a:effectRef idx="0">
+            <a:schemeClr val="accent1"/>
+          </a:effectRef>
+          <a:fontRef idx="minor">
+            <a:schemeClr val="tx1"/>
+          </a:fontRef>
+        </p:style>
+      </p:cxnSp>
+      <p:sp>
+        <p:nvSpPr>
+          <p:cNvPr id="18" name="TextBox 17">
+            <a:extLst>
+              <a:ext uri="{FF2B5EF4-FFF2-40B4-BE49-F238E27FC236}">
+                <a16:creationId xmlns:a16="http://schemas.microsoft.com/office/drawing/2014/main" id="{EB3B2EAE-0213-4E3A-A4BB-BEDC78158B19}"/>
+              </a:ext>
+            </a:extLst>
+          </p:cNvPr>
+          <p:cNvSpPr txBox="1"/>
+          <p:nvPr/>
+        </p:nvSpPr>
+        <p:spPr>
+          <a:xfrm>
+            <a:off x="7182467" y="2174879"/>
+            <a:ext cx="3392129" cy="1200329"/>
+          </a:xfrm>
+          <a:prstGeom prst="rect">
+            <a:avLst/>
+          </a:prstGeom>
+          <a:noFill/>
+        </p:spPr>
+        <p:txBody>
+          <a:bodyPr wrap="square" rtlCol="0">
+            <a:spAutoFit/>
+          </a:bodyPr>
+          <a:lstStyle/>
+          <a:p>
+            <a:pPr marL="342900" indent="-342900">
+              <a:buFont typeface="+mj-lt"/>
+              <a:buAutoNum type="arabicPeriod"/>
+            </a:pPr>
+            <a:r>
+              <a:rPr lang="en-US" dirty="0"/>
+              <a:t>Pedestal in front of pulse</a:t>
+            </a:r>
+          </a:p>
+          <a:p>
+            <a:pPr marL="342900" indent="-342900">
+              <a:buFont typeface="+mj-lt"/>
+              <a:buAutoNum type="arabicPeriod"/>
+            </a:pPr>
+            <a:r>
+              <a:rPr lang="en-US" dirty="0"/>
+              <a:t>Short integral of front end</a:t>
+            </a:r>
+          </a:p>
+          <a:p>
+            <a:pPr marL="342900" indent="-342900">
+              <a:buFont typeface="+mj-lt"/>
+              <a:buAutoNum type="arabicPeriod"/>
+            </a:pPr>
+            <a:r>
+              <a:rPr lang="en-US" dirty="0"/>
+              <a:t>Long integral of tail end</a:t>
+            </a:r>
+          </a:p>
+          <a:p>
+            <a:pPr marL="342900" indent="-342900">
+              <a:buFont typeface="+mj-lt"/>
+              <a:buAutoNum type="arabicPeriod"/>
+            </a:pPr>
+            <a:r>
+              <a:rPr lang="en-US" dirty="0"/>
+              <a:t>Full (or almost full) buffer</a:t>
+            </a:r>
+          </a:p>
+        </p:txBody>
+      </p:sp>
+      <p:sp>
+        <p:nvSpPr>
+          <p:cNvPr id="19" name="TextBox 18">
+            <a:extLst>
+              <a:ext uri="{FF2B5EF4-FFF2-40B4-BE49-F238E27FC236}">
+                <a16:creationId xmlns:a16="http://schemas.microsoft.com/office/drawing/2014/main" id="{29D821F2-8B21-EFEF-76C0-6B4749517EE7}"/>
+              </a:ext>
+            </a:extLst>
+          </p:cNvPr>
+          <p:cNvSpPr txBox="1"/>
+          <p:nvPr/>
+        </p:nvSpPr>
+        <p:spPr>
+          <a:xfrm>
+            <a:off x="769374" y="4308548"/>
+            <a:ext cx="1342104" cy="369332"/>
+          </a:xfrm>
+          <a:prstGeom prst="rect">
+            <a:avLst/>
+          </a:prstGeom>
+          <a:noFill/>
+        </p:spPr>
+        <p:txBody>
+          <a:bodyPr wrap="square" rtlCol="0">
+            <a:spAutoFit/>
+          </a:bodyPr>
+          <a:lstStyle/>
+          <a:p>
+            <a:pPr algn="ctr"/>
+            <a:r>
+              <a:rPr lang="en-US" dirty="0"/>
+              <a:t>16x250x16</a:t>
+            </a:r>
+          </a:p>
+        </p:txBody>
+      </p:sp>
+      <p:sp>
+        <p:nvSpPr>
+          <p:cNvPr id="20" name="TextBox 19">
+            <a:extLst>
+              <a:ext uri="{FF2B5EF4-FFF2-40B4-BE49-F238E27FC236}">
+                <a16:creationId xmlns:a16="http://schemas.microsoft.com/office/drawing/2014/main" id="{F75EEE29-9019-E278-ED69-417C99CE15C3}"/>
+              </a:ext>
+            </a:extLst>
+          </p:cNvPr>
+          <p:cNvSpPr txBox="1"/>
+          <p:nvPr/>
+        </p:nvSpPr>
+        <p:spPr>
+          <a:xfrm>
+            <a:off x="769374" y="5038904"/>
+            <a:ext cx="1342104" cy="369332"/>
+          </a:xfrm>
+          <a:prstGeom prst="rect">
+            <a:avLst/>
+          </a:prstGeom>
+          <a:noFill/>
+        </p:spPr>
+        <p:txBody>
+          <a:bodyPr wrap="square" rtlCol="0">
+            <a:spAutoFit/>
+          </a:bodyPr>
+          <a:lstStyle/>
+          <a:p>
+            <a:pPr algn="ctr"/>
+            <a:r>
+              <a:rPr lang="en-US" dirty="0"/>
+              <a:t>16x250x16</a:t>
+            </a:r>
+          </a:p>
+        </p:txBody>
+      </p:sp>
+      <p:sp>
+        <p:nvSpPr>
+          <p:cNvPr id="21" name="TextBox 20">
+            <a:extLst>
+              <a:ext uri="{FF2B5EF4-FFF2-40B4-BE49-F238E27FC236}">
+                <a16:creationId xmlns:a16="http://schemas.microsoft.com/office/drawing/2014/main" id="{553D83A0-EEFE-A6DD-D157-C7938F7E01FD}"/>
+              </a:ext>
+            </a:extLst>
+          </p:cNvPr>
+          <p:cNvSpPr txBox="1"/>
+          <p:nvPr/>
+        </p:nvSpPr>
+        <p:spPr>
+          <a:xfrm>
+            <a:off x="3967319" y="4711671"/>
+            <a:ext cx="1253612" cy="369332"/>
+          </a:xfrm>
+          <a:prstGeom prst="rect">
+            <a:avLst/>
+          </a:prstGeom>
+          <a:noFill/>
+        </p:spPr>
+        <p:txBody>
+          <a:bodyPr wrap="square" rtlCol="0">
+            <a:spAutoFit/>
+          </a:bodyPr>
+          <a:lstStyle/>
+          <a:p>
+            <a:pPr algn="ctr"/>
+            <a:r>
+              <a:rPr lang="en-US" dirty="0"/>
+              <a:t>16x250x16</a:t>
+            </a:r>
+          </a:p>
+        </p:txBody>
+      </p:sp>
+      <p:sp>
+        <p:nvSpPr>
+          <p:cNvPr id="22" name="TextBox 21">
+            <a:extLst>
+              <a:ext uri="{FF2B5EF4-FFF2-40B4-BE49-F238E27FC236}">
+                <a16:creationId xmlns:a16="http://schemas.microsoft.com/office/drawing/2014/main" id="{770102A1-EC36-EE03-B48C-4B11C9C3AD71}"/>
+              </a:ext>
+            </a:extLst>
+          </p:cNvPr>
+          <p:cNvSpPr txBox="1"/>
+          <p:nvPr/>
+        </p:nvSpPr>
+        <p:spPr>
+          <a:xfrm>
+            <a:off x="7765029" y="4716588"/>
+            <a:ext cx="1145458" cy="369332"/>
+          </a:xfrm>
+          <a:prstGeom prst="rect">
+            <a:avLst/>
+          </a:prstGeom>
+          <a:noFill/>
+        </p:spPr>
+        <p:txBody>
+          <a:bodyPr wrap="square" rtlCol="0">
+            <a:spAutoFit/>
+          </a:bodyPr>
+          <a:lstStyle/>
+          <a:p>
+            <a:pPr algn="ctr"/>
+            <a:r>
+              <a:rPr lang="en-US" dirty="0"/>
+              <a:t>16x4x20*</a:t>
+            </a:r>
+          </a:p>
+        </p:txBody>
+      </p:sp>
+      <p:sp>
+        <p:nvSpPr>
+          <p:cNvPr id="23" name="TextBox 22">
+            <a:extLst>
+              <a:ext uri="{FF2B5EF4-FFF2-40B4-BE49-F238E27FC236}">
+                <a16:creationId xmlns:a16="http://schemas.microsoft.com/office/drawing/2014/main" id="{9A311C3F-ECF5-D661-DDFD-656B955A332F}"/>
+              </a:ext>
+            </a:extLst>
+          </p:cNvPr>
+          <p:cNvSpPr txBox="1"/>
+          <p:nvPr/>
+        </p:nvSpPr>
+        <p:spPr>
+          <a:xfrm>
+            <a:off x="-18439" y="6495837"/>
+            <a:ext cx="2676837" cy="369332"/>
+          </a:xfrm>
+          <a:prstGeom prst="rect">
+            <a:avLst/>
+          </a:prstGeom>
+          <a:noFill/>
+        </p:spPr>
+        <p:txBody>
+          <a:bodyPr wrap="square" rtlCol="0">
+            <a:spAutoFit/>
+          </a:bodyPr>
+          <a:lstStyle/>
+          <a:p>
+            <a:pPr algn="ctr"/>
+            <a:r>
+              <a:rPr lang="en-US" i="1" dirty="0"/>
+              <a:t>Channels x Samples x Bits</a:t>
+            </a:r>
+          </a:p>
+        </p:txBody>
+      </p:sp>
+      <p:cxnSp>
+        <p:nvCxnSpPr>
+          <p:cNvPr id="25" name="Straight Arrow Connector 24">
+            <a:extLst>
+              <a:ext uri="{FF2B5EF4-FFF2-40B4-BE49-F238E27FC236}">
+                <a16:creationId xmlns:a16="http://schemas.microsoft.com/office/drawing/2014/main" id="{8F29827A-6341-5032-CD18-D2F299B14E57}"/>
+              </a:ext>
+            </a:extLst>
+          </p:cNvPr>
+          <p:cNvCxnSpPr>
+            <a:cxnSpLocks/>
+            <a:stCxn id="19" idx="3"/>
+            <a:endCxn id="21" idx="1"/>
+          </p:cNvCxnSpPr>
+          <p:nvPr/>
+        </p:nvCxnSpPr>
+        <p:spPr>
+          <a:xfrm>
+            <a:off x="2111478" y="4493214"/>
+            <a:ext cx="1855841" cy="403123"/>
+          </a:xfrm>
+          <a:prstGeom prst="straightConnector1">
+            <a:avLst/>
+          </a:prstGeom>
+          <a:ln w="38100">
+            <a:tailEnd type="triangle"/>
+          </a:ln>
+        </p:spPr>
+        <p:style>
+          <a:lnRef idx="1">
+            <a:schemeClr val="accent1"/>
+          </a:lnRef>
+          <a:fillRef idx="0">
+            <a:schemeClr val="accent1"/>
+          </a:fillRef>
+          <a:effectRef idx="0">
+            <a:schemeClr val="accent1"/>
+          </a:effectRef>
+          <a:fontRef idx="minor">
+            <a:schemeClr val="tx1"/>
+          </a:fontRef>
+        </p:style>
+      </p:cxnSp>
+      <p:cxnSp>
+        <p:nvCxnSpPr>
+          <p:cNvPr id="28" name="Straight Arrow Connector 27">
+            <a:extLst>
+              <a:ext uri="{FF2B5EF4-FFF2-40B4-BE49-F238E27FC236}">
+                <a16:creationId xmlns:a16="http://schemas.microsoft.com/office/drawing/2014/main" id="{C06FF382-B912-8407-C22E-4754ED463646}"/>
+              </a:ext>
+            </a:extLst>
+          </p:cNvPr>
+          <p:cNvCxnSpPr>
+            <a:stCxn id="20" idx="3"/>
+            <a:endCxn id="21" idx="1"/>
+          </p:cNvCxnSpPr>
+          <p:nvPr/>
+        </p:nvCxnSpPr>
+        <p:spPr>
+          <a:xfrm flipV="1">
+            <a:off x="2111478" y="4896337"/>
+            <a:ext cx="1855841" cy="327233"/>
+          </a:xfrm>
+          <a:prstGeom prst="straightConnector1">
+            <a:avLst/>
+          </a:prstGeom>
+          <a:ln w="38100">
+            <a:tailEnd type="triangle"/>
+          </a:ln>
+        </p:spPr>
+        <p:style>
+          <a:lnRef idx="1">
+            <a:schemeClr val="accent1"/>
+          </a:lnRef>
+          <a:fillRef idx="0">
+            <a:schemeClr val="accent1"/>
+          </a:fillRef>
+          <a:effectRef idx="0">
+            <a:schemeClr val="accent1"/>
+          </a:effectRef>
+          <a:fontRef idx="minor">
+            <a:schemeClr val="tx1"/>
+          </a:fontRef>
+        </p:style>
+      </p:cxnSp>
+      <p:cxnSp>
+        <p:nvCxnSpPr>
+          <p:cNvPr id="30" name="Straight Arrow Connector 29">
+            <a:extLst>
+              <a:ext uri="{FF2B5EF4-FFF2-40B4-BE49-F238E27FC236}">
+                <a16:creationId xmlns:a16="http://schemas.microsoft.com/office/drawing/2014/main" id="{5BEF78E7-9D00-DCF3-A202-A0450AA4110C}"/>
+              </a:ext>
+            </a:extLst>
+          </p:cNvPr>
+          <p:cNvCxnSpPr>
+            <a:stCxn id="21" idx="3"/>
+            <a:endCxn id="22" idx="1"/>
+          </p:cNvCxnSpPr>
+          <p:nvPr/>
+        </p:nvCxnSpPr>
+        <p:spPr>
+          <a:xfrm>
+            <a:off x="5220931" y="4896337"/>
+            <a:ext cx="2544098" cy="4917"/>
+          </a:xfrm>
+          <a:prstGeom prst="straightConnector1">
+            <a:avLst/>
+          </a:prstGeom>
+          <a:ln w="38100">
+            <a:tailEnd type="triangle"/>
+          </a:ln>
+        </p:spPr>
+        <p:style>
+          <a:lnRef idx="1">
+            <a:schemeClr val="accent1"/>
+          </a:lnRef>
+          <a:fillRef idx="0">
+            <a:schemeClr val="accent1"/>
+          </a:fillRef>
+          <a:effectRef idx="0">
+            <a:schemeClr val="accent1"/>
+          </a:effectRef>
+          <a:fontRef idx="minor">
+            <a:schemeClr val="tx1"/>
+          </a:fontRef>
+        </p:style>
+      </p:cxnSp>
+      <p:sp>
+        <p:nvSpPr>
+          <p:cNvPr id="31" name="TextBox 30">
+            <a:extLst>
+              <a:ext uri="{FF2B5EF4-FFF2-40B4-BE49-F238E27FC236}">
+                <a16:creationId xmlns:a16="http://schemas.microsoft.com/office/drawing/2014/main" id="{8962DDEF-2927-6E0C-BC74-3AE9CFD70DF3}"/>
+              </a:ext>
+            </a:extLst>
+          </p:cNvPr>
+          <p:cNvSpPr txBox="1"/>
+          <p:nvPr/>
+        </p:nvSpPr>
+        <p:spPr>
+          <a:xfrm>
+            <a:off x="7714428" y="6488668"/>
+            <a:ext cx="4477572" cy="369332"/>
+          </a:xfrm>
+          <a:prstGeom prst="rect">
+            <a:avLst/>
+          </a:prstGeom>
+          <a:noFill/>
+        </p:spPr>
+        <p:txBody>
+          <a:bodyPr wrap="none" rtlCol="0">
+            <a:spAutoFit/>
+          </a:bodyPr>
+          <a:lstStyle/>
+          <a:p>
+            <a:r>
+              <a:rPr lang="en-US" dirty="0"/>
+              <a:t>*Could be 16x4x16 with FP Data Compression</a:t>
+            </a:r>
+          </a:p>
+        </p:txBody>
+      </p:sp>
+      <p:pic>
+        <p:nvPicPr>
+          <p:cNvPr id="33" name="Picture 32">
+            <a:extLst>
+              <a:ext uri="{FF2B5EF4-FFF2-40B4-BE49-F238E27FC236}">
+                <a16:creationId xmlns:a16="http://schemas.microsoft.com/office/drawing/2014/main" id="{1C8DA2BB-A617-FBEA-1564-E260CFA37FB7}"/>
+              </a:ext>
+            </a:extLst>
+          </p:cNvPr>
+          <p:cNvPicPr>
+            <a:picLocks noChangeAspect="1"/>
+          </p:cNvPicPr>
+          <p:nvPr/>
+        </p:nvPicPr>
+        <p:blipFill rotWithShape="1">
+          <a:blip r:embed="rId2">
+            <a:extLst>
+              <a:ext uri="{28A0092B-C50C-407E-A947-70E740481C1C}">
+                <a14:useLocalDpi xmlns:a14="http://schemas.microsoft.com/office/drawing/2010/main" val="0"/>
+              </a:ext>
+            </a:extLst>
+          </a:blip>
+          <a:srcRect l="22039" t="19032" r="12876" b="22505"/>
+          <a:stretch/>
+        </p:blipFill>
+        <p:spPr>
+          <a:xfrm>
+            <a:off x="7176879" y="239781"/>
+            <a:ext cx="2872361" cy="1935098"/>
+          </a:xfrm>
+          <a:prstGeom prst="rect">
+            <a:avLst/>
+          </a:prstGeom>
+        </p:spPr>
+      </p:pic>
+    </p:spTree>
+    <p:extLst>
+      <p:ext uri="{BB962C8B-B14F-4D97-AF65-F5344CB8AC3E}">
+        <p14:creationId xmlns:p14="http://schemas.microsoft.com/office/powerpoint/2010/main" val="1397133607"/>
       </p:ext>
     </p:extLst>
   </p:cSld>
@@ -3694,7 +4612,9 @@
         </p:nvSpPr>
         <p:spPr/>
         <p:txBody>
-          <a:bodyPr/>
+          <a:bodyPr>
+            <a:normAutofit lnSpcReduction="10000"/>
+          </a:bodyPr>
           <a:lstStyle/>
           <a:p>
             <a:r>
@@ -3705,6 +4625,12 @@
           <a:p>
             <a:r>
               <a:rPr lang="en-US" dirty="0"/>
+              <a:t>The Big Questions: How well can HLS implement our design? How many ASICs can we process on one FPGA?</a:t>
+            </a:r>
+          </a:p>
+          <a:p>
+            <a:r>
+              <a:rPr lang="en-US" dirty="0"/>
               <a:t>This pre-processing includes:</a:t>
             </a:r>
           </a:p>
@@ -3726,7 +4652,7 @@
             <a:pPr lvl="1"/>
             <a:r>
               <a:rPr lang="en-US" dirty="0"/>
-              <a:t>Additional Algorithms (TBD)</a:t>
+              <a:t>Additional Algorithms (Centroiding, Zero Suppression, Multi-event detection, Data Compression)</a:t>
             </a:r>
           </a:p>
         </p:txBody>
@@ -4371,13 +5297,15 @@
               </a:ext>
             </a:extLst>
           </p:cNvPr>
-          <p:cNvCxnSpPr/>
+          <p:cNvCxnSpPr>
+            <a:cxnSpLocks/>
+          </p:cNvCxnSpPr>
           <p:nvPr/>
         </p:nvCxnSpPr>
         <p:spPr>
           <a:xfrm>
-            <a:off x="3701845" y="3790335"/>
-            <a:ext cx="1413387" cy="398207"/>
+            <a:off x="3970391" y="3811829"/>
+            <a:ext cx="1144841" cy="376713"/>
           </a:xfrm>
           <a:prstGeom prst="straightConnector1">
             <a:avLst/>
@@ -4412,14 +5340,14 @@
           </p:cNvPr>
           <p:cNvCxnSpPr>
             <a:cxnSpLocks/>
-            <a:endCxn id="4" idx="1"/>
+            <a:stCxn id="19" idx="3"/>
           </p:cNvCxnSpPr>
           <p:nvPr/>
         </p:nvCxnSpPr>
         <p:spPr>
           <a:xfrm>
-            <a:off x="3701845" y="4576481"/>
-            <a:ext cx="1413387" cy="0"/>
+            <a:off x="3902177" y="4173452"/>
+            <a:ext cx="1213055" cy="295138"/>
           </a:xfrm>
           <a:prstGeom prst="straightConnector1">
             <a:avLst/>
@@ -4459,8 +5387,8 @@
         </p:nvCxnSpPr>
         <p:spPr>
           <a:xfrm flipV="1">
-            <a:off x="3701845" y="4952564"/>
-            <a:ext cx="1413387" cy="398207"/>
+            <a:off x="3902177" y="4952564"/>
+            <a:ext cx="1213055" cy="339478"/>
           </a:xfrm>
           <a:prstGeom prst="straightConnector1">
             <a:avLst/>
@@ -4578,7 +5506,7 @@
         </p:nvSpPr>
         <p:spPr>
           <a:xfrm>
-            <a:off x="1919749" y="3605669"/>
+            <a:off x="2172929" y="3610513"/>
             <a:ext cx="1782096" cy="369332"/>
           </a:xfrm>
           <a:prstGeom prst="rect">
@@ -4613,7 +5541,7 @@
         </p:nvSpPr>
         <p:spPr>
           <a:xfrm>
-            <a:off x="2610465" y="4391815"/>
+            <a:off x="2810797" y="3988786"/>
             <a:ext cx="1091380" cy="369332"/>
           </a:xfrm>
           <a:prstGeom prst="rect">
@@ -4648,7 +5576,7 @@
         </p:nvSpPr>
         <p:spPr>
           <a:xfrm>
-            <a:off x="1919749" y="5177961"/>
+            <a:off x="2120081" y="5122303"/>
             <a:ext cx="1782096" cy="369332"/>
           </a:xfrm>
           <a:prstGeom prst="rect">
@@ -4745,6 +5673,82 @@
             <a:r>
               <a:rPr lang="en-US" dirty="0"/>
               <a:t>(used for human-readable debugging)</a:t>
+            </a:r>
+          </a:p>
+        </p:txBody>
+      </p:sp>
+      <p:cxnSp>
+        <p:nvCxnSpPr>
+          <p:cNvPr id="9" name="Straight Arrow Connector 8">
+            <a:extLst>
+              <a:ext uri="{FF2B5EF4-FFF2-40B4-BE49-F238E27FC236}">
+                <a16:creationId xmlns:a16="http://schemas.microsoft.com/office/drawing/2014/main" id="{8F1BE026-1A8A-14C0-2670-BB579DEC2722}"/>
+              </a:ext>
+            </a:extLst>
+          </p:cNvPr>
+          <p:cNvCxnSpPr>
+            <a:cxnSpLocks/>
+          </p:cNvCxnSpPr>
+          <p:nvPr/>
+        </p:nvCxnSpPr>
+        <p:spPr>
+          <a:xfrm flipV="1">
+            <a:off x="3899719" y="4678801"/>
+            <a:ext cx="1217971" cy="31775"/>
+          </a:xfrm>
+          <a:prstGeom prst="straightConnector1">
+            <a:avLst/>
+          </a:prstGeom>
+          <a:ln w="76200">
+            <a:tailEnd type="triangle"/>
+          </a:ln>
+        </p:spPr>
+        <p:style>
+          <a:lnRef idx="1">
+            <a:schemeClr val="accent1"/>
+          </a:lnRef>
+          <a:fillRef idx="0">
+            <a:schemeClr val="accent1"/>
+          </a:fillRef>
+          <a:effectRef idx="0">
+            <a:schemeClr val="accent1"/>
+          </a:effectRef>
+          <a:fontRef idx="minor">
+            <a:schemeClr val="tx1"/>
+          </a:fontRef>
+        </p:style>
+      </p:cxnSp>
+      <p:sp>
+        <p:nvSpPr>
+          <p:cNvPr id="12" name="TextBox 11">
+            <a:extLst>
+              <a:ext uri="{FF2B5EF4-FFF2-40B4-BE49-F238E27FC236}">
+                <a16:creationId xmlns:a16="http://schemas.microsoft.com/office/drawing/2014/main" id="{27710405-6623-1745-8384-C20988083C94}"/>
+              </a:ext>
+            </a:extLst>
+          </p:cNvPr>
+          <p:cNvSpPr txBox="1"/>
+          <p:nvPr/>
+        </p:nvSpPr>
+        <p:spPr>
+          <a:xfrm>
+            <a:off x="2254045" y="4510022"/>
+            <a:ext cx="1619864" cy="369332"/>
+          </a:xfrm>
+          <a:prstGeom prst="rect">
+            <a:avLst/>
+          </a:prstGeom>
+          <a:noFill/>
+        </p:spPr>
+        <p:txBody>
+          <a:bodyPr wrap="square" rtlCol="0">
+            <a:spAutoFit/>
+          </a:bodyPr>
+          <a:lstStyle/>
+          <a:p>
+            <a:r>
+              <a:rPr lang="en-US" dirty="0"/>
+              <a:t>Trigger Position</a:t>
             </a:r>
           </a:p>
         </p:txBody>

</xml_diff>

<commit_message>
Modified based on comments in research meeting
</commit_message>
<xml_diff>
--- a/Research Summary.pptx
+++ b/Research Summary.pptx
@@ -269,7 +269,7 @@
           <a:p>
             <a:fld id="{F4774072-BA16-42B2-B396-A300A3EBF598}" type="datetimeFigureOut">
               <a:rPr lang="en-US" smtClean="0"/>
-              <a:t>9/6/2022</a:t>
+              <a:t>9/7/2022</a:t>
             </a:fld>
             <a:endParaRPr lang="en-US"/>
           </a:p>
@@ -467,7 +467,7 @@
           <a:p>
             <a:fld id="{F4774072-BA16-42B2-B396-A300A3EBF598}" type="datetimeFigureOut">
               <a:rPr lang="en-US" smtClean="0"/>
-              <a:t>9/6/2022</a:t>
+              <a:t>9/7/2022</a:t>
             </a:fld>
             <a:endParaRPr lang="en-US"/>
           </a:p>
@@ -675,7 +675,7 @@
           <a:p>
             <a:fld id="{F4774072-BA16-42B2-B396-A300A3EBF598}" type="datetimeFigureOut">
               <a:rPr lang="en-US" smtClean="0"/>
-              <a:t>9/6/2022</a:t>
+              <a:t>9/7/2022</a:t>
             </a:fld>
             <a:endParaRPr lang="en-US"/>
           </a:p>
@@ -873,7 +873,7 @@
           <a:p>
             <a:fld id="{F4774072-BA16-42B2-B396-A300A3EBF598}" type="datetimeFigureOut">
               <a:rPr lang="en-US" smtClean="0"/>
-              <a:t>9/6/2022</a:t>
+              <a:t>9/7/2022</a:t>
             </a:fld>
             <a:endParaRPr lang="en-US"/>
           </a:p>
@@ -1148,7 +1148,7 @@
           <a:p>
             <a:fld id="{F4774072-BA16-42B2-B396-A300A3EBF598}" type="datetimeFigureOut">
               <a:rPr lang="en-US" smtClean="0"/>
-              <a:t>9/6/2022</a:t>
+              <a:t>9/7/2022</a:t>
             </a:fld>
             <a:endParaRPr lang="en-US"/>
           </a:p>
@@ -1413,7 +1413,7 @@
           <a:p>
             <a:fld id="{F4774072-BA16-42B2-B396-A300A3EBF598}" type="datetimeFigureOut">
               <a:rPr lang="en-US" smtClean="0"/>
-              <a:t>9/6/2022</a:t>
+              <a:t>9/7/2022</a:t>
             </a:fld>
             <a:endParaRPr lang="en-US"/>
           </a:p>
@@ -1825,7 +1825,7 @@
           <a:p>
             <a:fld id="{F4774072-BA16-42B2-B396-A300A3EBF598}" type="datetimeFigureOut">
               <a:rPr lang="en-US" smtClean="0"/>
-              <a:t>9/6/2022</a:t>
+              <a:t>9/7/2022</a:t>
             </a:fld>
             <a:endParaRPr lang="en-US"/>
           </a:p>
@@ -1966,7 +1966,7 @@
           <a:p>
             <a:fld id="{F4774072-BA16-42B2-B396-A300A3EBF598}" type="datetimeFigureOut">
               <a:rPr lang="en-US" smtClean="0"/>
-              <a:t>9/6/2022</a:t>
+              <a:t>9/7/2022</a:t>
             </a:fld>
             <a:endParaRPr lang="en-US"/>
           </a:p>
@@ -2079,7 +2079,7 @@
           <a:p>
             <a:fld id="{F4774072-BA16-42B2-B396-A300A3EBF598}" type="datetimeFigureOut">
               <a:rPr lang="en-US" smtClean="0"/>
-              <a:t>9/6/2022</a:t>
+              <a:t>9/7/2022</a:t>
             </a:fld>
             <a:endParaRPr lang="en-US"/>
           </a:p>
@@ -2390,7 +2390,7 @@
           <a:p>
             <a:fld id="{F4774072-BA16-42B2-B396-A300A3EBF598}" type="datetimeFigureOut">
               <a:rPr lang="en-US" smtClean="0"/>
-              <a:t>9/6/2022</a:t>
+              <a:t>9/7/2022</a:t>
             </a:fld>
             <a:endParaRPr lang="en-US"/>
           </a:p>
@@ -2678,7 +2678,7 @@
           <a:p>
             <a:fld id="{F4774072-BA16-42B2-B396-A300A3EBF598}" type="datetimeFigureOut">
               <a:rPr lang="en-US" smtClean="0"/>
-              <a:t>9/6/2022</a:t>
+              <a:t>9/7/2022</a:t>
             </a:fld>
             <a:endParaRPr lang="en-US"/>
           </a:p>
@@ -2919,7 +2919,7 @@
           <a:p>
             <a:fld id="{F4774072-BA16-42B2-B396-A300A3EBF598}" type="datetimeFigureOut">
               <a:rPr lang="en-US" smtClean="0"/>
-              <a:t>9/6/2022</a:t>
+              <a:t>9/7/2022</a:t>
             </a:fld>
             <a:endParaRPr lang="en-US"/>
           </a:p>
@@ -3724,8 +3724,8 @@
         </p:nvSpPr>
         <p:spPr>
           <a:xfrm>
-            <a:off x="619432" y="2052012"/>
-            <a:ext cx="1401097" cy="646331"/>
+            <a:off x="619432" y="2174879"/>
+            <a:ext cx="1401097" cy="369332"/>
           </a:xfrm>
           <a:prstGeom prst="rect">
             <a:avLst/>
@@ -3742,13 +3742,6 @@
             <a:r>
               <a:rPr lang="en-US" dirty="0"/>
               <a:t>Samples </a:t>
-            </a:r>
-          </a:p>
-          <a:p>
-            <a:pPr algn="ctr"/>
-            <a:r>
-              <a:rPr lang="en-US" dirty="0"/>
-              <a:t>(+ Offset)</a:t>
             </a:r>
           </a:p>
         </p:txBody>
@@ -4098,7 +4091,7 @@
             <a:pPr algn="ctr"/>
             <a:r>
               <a:rPr lang="en-US" dirty="0"/>
-              <a:t>16x250x16</a:t>
+              <a:t>16x250x12</a:t>
             </a:r>
           </a:p>
         </p:txBody>
@@ -4134,7 +4127,7 @@
             <a:pPr algn="ctr"/>
             <a:r>
               <a:rPr lang="en-US" dirty="0"/>
-              <a:t>16x250x16</a:t>
+              <a:t>16x250x12</a:t>
             </a:r>
           </a:p>
         </p:txBody>
@@ -4170,7 +4163,7 @@
             <a:pPr algn="ctr"/>
             <a:r>
               <a:rPr lang="en-US" dirty="0"/>
-              <a:t>16x250x16</a:t>
+              <a:t>16x250x13</a:t>
             </a:r>
           </a:p>
         </p:txBody>
@@ -4206,7 +4199,7 @@
             <a:pPr algn="ctr"/>
             <a:r>
               <a:rPr lang="en-US" dirty="0"/>
-              <a:t>16x4x20*</a:t>
+              <a:t>16x4x21*</a:t>
             </a:r>
           </a:p>
         </p:txBody>

</xml_diff>